<commit_message>
let's "build" things out a little
</commit_message>
<xml_diff>
--- a/npm_scripts.pptx
+++ b/npm_scripts.pptx
@@ -624,7 +624,7 @@
             <a:fld id="{B61BEF0D-F0BB-DE4B-95CE-6DB70DBA9567}" type="datetimeFigureOut">
               <a:rPr lang="en-US" smtClean="0"/>
               <a:pPr/>
-              <a:t>4/20/16</a:t>
+              <a:t>4/24/16</a:t>
             </a:fld>
             <a:endParaRPr lang="en-US" dirty="0"/>
           </a:p>
@@ -922,7 +922,7 @@
             <a:fld id="{B61BEF0D-F0BB-DE4B-95CE-6DB70DBA9567}" type="datetimeFigureOut">
               <a:rPr lang="en-US" smtClean="0"/>
               <a:pPr/>
-              <a:t>4/20/16</a:t>
+              <a:t>4/24/16</a:t>
             </a:fld>
             <a:endParaRPr lang="en-US" dirty="0"/>
           </a:p>
@@ -1172,7 +1172,7 @@
             <a:fld id="{B61BEF0D-F0BB-DE4B-95CE-6DB70DBA9567}" type="datetimeFigureOut">
               <a:rPr lang="en-US" smtClean="0"/>
               <a:pPr/>
-              <a:t>4/20/16</a:t>
+              <a:t>4/24/16</a:t>
             </a:fld>
             <a:endParaRPr lang="en-US" dirty="0"/>
           </a:p>
@@ -1714,7 +1714,7 @@
             <a:fld id="{B61BEF0D-F0BB-DE4B-95CE-6DB70DBA9567}" type="datetimeFigureOut">
               <a:rPr lang="en-US" smtClean="0"/>
               <a:pPr/>
-              <a:t>4/20/16</a:t>
+              <a:t>4/24/16</a:t>
             </a:fld>
             <a:endParaRPr lang="en-US" dirty="0"/>
           </a:p>
@@ -1964,7 +1964,7 @@
             <a:fld id="{B61BEF0D-F0BB-DE4B-95CE-6DB70DBA9567}" type="datetimeFigureOut">
               <a:rPr lang="en-US" smtClean="0"/>
               <a:pPr/>
-              <a:t>4/20/16</a:t>
+              <a:t>4/24/16</a:t>
             </a:fld>
             <a:endParaRPr lang="en-US" dirty="0"/>
           </a:p>
@@ -2498,7 +2498,7 @@
             <a:fld id="{B61BEF0D-F0BB-DE4B-95CE-6DB70DBA9567}" type="datetimeFigureOut">
               <a:rPr lang="en-US" smtClean="0"/>
               <a:pPr/>
-              <a:t>4/20/16</a:t>
+              <a:t>4/24/16</a:t>
             </a:fld>
             <a:endParaRPr lang="en-US" dirty="0"/>
           </a:p>
@@ -2797,7 +2797,7 @@
             <a:fld id="{B61BEF0D-F0BB-DE4B-95CE-6DB70DBA9567}" type="datetimeFigureOut">
               <a:rPr lang="en-US" smtClean="0"/>
               <a:pPr/>
-              <a:t>4/20/16</a:t>
+              <a:t>4/24/16</a:t>
             </a:fld>
             <a:endParaRPr lang="en-US" dirty="0"/>
           </a:p>
@@ -2973,7 +2973,7 @@
             <a:fld id="{B61BEF0D-F0BB-DE4B-95CE-6DB70DBA9567}" type="datetimeFigureOut">
               <a:rPr lang="en-US" smtClean="0"/>
               <a:pPr/>
-              <a:t>4/20/16</a:t>
+              <a:t>4/24/16</a:t>
             </a:fld>
             <a:endParaRPr lang="en-US" dirty="0"/>
           </a:p>
@@ -3155,7 +3155,7 @@
             <a:fld id="{B61BEF0D-F0BB-DE4B-95CE-6DB70DBA9567}" type="datetimeFigureOut">
               <a:rPr lang="en-US" smtClean="0"/>
               <a:pPr/>
-              <a:t>4/20/16</a:t>
+              <a:t>4/24/16</a:t>
             </a:fld>
             <a:endParaRPr lang="en-US" dirty="0"/>
           </a:p>
@@ -3327,7 +3327,7 @@
             <a:fld id="{B61BEF0D-F0BB-DE4B-95CE-6DB70DBA9567}" type="datetimeFigureOut">
               <a:rPr lang="en-US" smtClean="0"/>
               <a:pPr/>
-              <a:t>4/20/16</a:t>
+              <a:t>4/24/16</a:t>
             </a:fld>
             <a:endParaRPr lang="en-US" dirty="0"/>
           </a:p>
@@ -3580,7 +3580,7 @@
             <a:fld id="{B61BEF0D-F0BB-DE4B-95CE-6DB70DBA9567}" type="datetimeFigureOut">
               <a:rPr lang="en-US" smtClean="0"/>
               <a:pPr/>
-              <a:t>4/20/16</a:t>
+              <a:t>4/24/16</a:t>
             </a:fld>
             <a:endParaRPr lang="en-US" dirty="0"/>
           </a:p>
@@ -3879,7 +3879,7 @@
             <a:fld id="{B61BEF0D-F0BB-DE4B-95CE-6DB70DBA9567}" type="datetimeFigureOut">
               <a:rPr lang="en-US" smtClean="0"/>
               <a:pPr/>
-              <a:t>4/20/16</a:t>
+              <a:t>4/24/16</a:t>
             </a:fld>
             <a:endParaRPr lang="en-US" dirty="0"/>
           </a:p>
@@ -4323,7 +4323,7 @@
             <a:fld id="{B61BEF0D-F0BB-DE4B-95CE-6DB70DBA9567}" type="datetimeFigureOut">
               <a:rPr lang="en-US" smtClean="0"/>
               <a:pPr/>
-              <a:t>4/20/16</a:t>
+              <a:t>4/24/16</a:t>
             </a:fld>
             <a:endParaRPr lang="en-US" dirty="0"/>
           </a:p>
@@ -4443,7 +4443,7 @@
             <a:fld id="{B61BEF0D-F0BB-DE4B-95CE-6DB70DBA9567}" type="datetimeFigureOut">
               <a:rPr lang="en-US" smtClean="0"/>
               <a:pPr/>
-              <a:t>4/20/16</a:t>
+              <a:t>4/24/16</a:t>
             </a:fld>
             <a:endParaRPr lang="en-US" dirty="0"/>
           </a:p>
@@ -4540,7 +4540,7 @@
             <a:fld id="{B61BEF0D-F0BB-DE4B-95CE-6DB70DBA9567}" type="datetimeFigureOut">
               <a:rPr lang="en-US" smtClean="0"/>
               <a:pPr/>
-              <a:t>4/20/16</a:t>
+              <a:t>4/24/16</a:t>
             </a:fld>
             <a:endParaRPr lang="en-US" dirty="0"/>
           </a:p>
@@ -4825,7 +4825,7 @@
             <a:fld id="{B61BEF0D-F0BB-DE4B-95CE-6DB70DBA9567}" type="datetimeFigureOut">
               <a:rPr lang="en-US" smtClean="0"/>
               <a:pPr/>
-              <a:t>4/20/16</a:t>
+              <a:t>4/24/16</a:t>
             </a:fld>
             <a:endParaRPr lang="en-US" dirty="0"/>
           </a:p>
@@ -5118,7 +5118,7 @@
             <a:fld id="{B61BEF0D-F0BB-DE4B-95CE-6DB70DBA9567}" type="datetimeFigureOut">
               <a:rPr lang="en-US" smtClean="0"/>
               <a:pPr/>
-              <a:t>4/20/16</a:t>
+              <a:t>4/24/16</a:t>
             </a:fld>
             <a:endParaRPr lang="en-US" dirty="0"/>
           </a:p>
@@ -5650,7 +5650,7 @@
             <a:fld id="{B61BEF0D-F0BB-DE4B-95CE-6DB70DBA9567}" type="datetimeFigureOut">
               <a:rPr lang="en-US" smtClean="0"/>
               <a:pPr/>
-              <a:t>4/20/16</a:t>
+              <a:t>4/24/16</a:t>
             </a:fld>
             <a:endParaRPr lang="en-US" dirty="0"/>
           </a:p>
@@ -6685,7 +6685,15 @@
             <a:pPr lvl="1"/>
             <a:r>
               <a:rPr lang="en-US" dirty="0"/>
-              <a:t>Just hit 1.0.0 on Apr 4 – now is the time to switch!</a:t>
+              <a:t>Just hit 1.0.0 on Apr 4 – now is </a:t>
+            </a:r>
+            <a:r>
+              <a:rPr lang="en-US" dirty="0" smtClean="0"/>
+              <a:t>the perfect </a:t>
+            </a:r>
+            <a:r>
+              <a:rPr lang="en-US" dirty="0"/>
+              <a:t>time to switch!</a:t>
             </a:r>
           </a:p>
           <a:p>
@@ -6709,19 +6717,7 @@
             <a:pPr lvl="1"/>
             <a:r>
               <a:rPr lang="en-US" dirty="0" smtClean="0"/>
-              <a:t>Task sequencing is more </a:t>
-            </a:r>
-            <a:r>
-              <a:rPr lang="en-US" dirty="0" smtClean="0"/>
-              <a:t>difficult (to be addressed </a:t>
-            </a:r>
-            <a:r>
-              <a:rPr lang="en-US" smtClean="0"/>
-              <a:t>in v4.0</a:t>
-            </a:r>
-            <a:r>
-              <a:rPr lang="en-US" dirty="0" smtClean="0"/>
-              <a:t>)</a:t>
+              <a:t>Task sequencing is more difficult (to be addressed in v4.0)</a:t>
             </a:r>
             <a:endParaRPr lang="en-US" dirty="0"/>
           </a:p>
@@ -6813,7 +6809,11 @@
           <a:p>
             <a:r>
               <a:rPr lang="en-US" dirty="0" smtClean="0"/>
-              <a:t>What’s the problem?</a:t>
+              <a:t>So what’s </a:t>
+            </a:r>
+            <a:r>
+              <a:rPr lang="en-US" dirty="0" smtClean="0"/>
+              <a:t>the problem?</a:t>
             </a:r>
             <a:endParaRPr lang="en-US" dirty="0"/>
           </a:p>
@@ -6870,8 +6870,12 @@
           </a:p>
           <a:p>
             <a:r>
+              <a:rPr lang="en-US" b="1" i="1" dirty="0" smtClean="0"/>
+              <a:t>Add</a:t>
+            </a:r>
+            <a:r>
               <a:rPr lang="en-US" dirty="0" smtClean="0"/>
-              <a:t>Add to code and </a:t>
+              <a:t> to code and </a:t>
             </a:r>
             <a:r>
               <a:rPr lang="en-US" dirty="0"/>
@@ -6898,25 +6902,26 @@
           </a:p>
           <a:p>
             <a:r>
+              <a:rPr lang="en-US" b="1" dirty="0" smtClean="0"/>
+              <a:t>Even if accept those shortcomings, you still should NOT use </a:t>
+            </a:r>
+            <a:r>
+              <a:rPr lang="en-US" b="1" dirty="0" smtClean="0"/>
+              <a:t>these </a:t>
+            </a:r>
+            <a:r>
+              <a:rPr lang="en-US" b="1" dirty="0" err="1" smtClean="0"/>
+              <a:t>taskrunners</a:t>
+            </a:r>
+            <a:r>
               <a:rPr lang="en-US" b="1" dirty="0"/>
-              <a:t>What’s </a:t>
+              <a:t> </a:t>
             </a:r>
             <a:r>
               <a:rPr lang="en-US" b="1" dirty="0" smtClean="0"/>
-              <a:t>wrong </a:t>
-            </a:r>
-            <a:r>
-              <a:rPr lang="en-US" b="1" dirty="0"/>
-              <a:t>with these </a:t>
-            </a:r>
-            <a:r>
-              <a:rPr lang="en-US" b="1" dirty="0" err="1"/>
-              <a:t>taskrunners</a:t>
-            </a:r>
-            <a:r>
-              <a:rPr lang="en-US" b="1" dirty="0"/>
-              <a:t>? </a:t>
-            </a:r>
+              <a:t>because:</a:t>
+            </a:r>
+            <a:endParaRPr lang="en-US" b="1" dirty="0"/>
           </a:p>
           <a:p>
             <a:pPr lvl="1"/>
@@ -7057,7 +7062,7 @@
           <a:p>
             <a:r>
               <a:rPr lang="en-US" dirty="0" smtClean="0"/>
-              <a:t>Creates </a:t>
+              <a:t>Create </a:t>
             </a:r>
             <a:r>
               <a:rPr lang="en-US" dirty="0"/>
@@ -7270,12 +7275,8 @@
           <a:p>
             <a:pPr lvl="1"/>
             <a:r>
-              <a:rPr lang="en-US" dirty="0" err="1" smtClean="0"/>
-              <a:t>Typcially</a:t>
-            </a:r>
-            <a:r>
-              <a:rPr lang="en-US" dirty="0"/>
-              <a:t> </a:t>
+              <a:rPr lang="en-US" dirty="0" smtClean="0"/>
+              <a:t>Typically </a:t>
             </a:r>
             <a:r>
               <a:rPr lang="en-US" dirty="0" smtClean="0"/>
@@ -7382,7 +7383,11 @@
             </a:r>
             <a:r>
               <a:rPr lang="en-US" dirty="0" smtClean="0"/>
-              <a:t>plugin documentation</a:t>
+              <a:t>plugin </a:t>
+            </a:r>
+            <a:r>
+              <a:rPr lang="en-US" dirty="0" smtClean="0"/>
+              <a:t>docs</a:t>
             </a:r>
             <a:endParaRPr lang="en-US" dirty="0"/>
           </a:p>
@@ -7483,8 +7488,8 @@
         </p:nvSpPr>
         <p:spPr>
           <a:xfrm>
-            <a:off x="1484310" y="2140773"/>
-            <a:ext cx="10018713" cy="3650428"/>
+            <a:off x="1484310" y="2140772"/>
+            <a:ext cx="10018713" cy="4249270"/>
           </a:xfrm>
         </p:spPr>
         <p:txBody>
@@ -7560,10 +7565,81 @@
             </a:r>
             <a:r>
               <a:rPr lang="en-US" dirty="0"/>
-              <a:t>as opposed to multiple configuration files for your build process</a:t>
-            </a:r>
-          </a:p>
-          <a:p>
+              <a:t>as opposed to </a:t>
+            </a:r>
+            <a:r>
+              <a:rPr lang="en-US" dirty="0" smtClean="0"/>
+              <a:t>multiple </a:t>
+            </a:r>
+            <a:r>
+              <a:rPr lang="en-US" dirty="0"/>
+              <a:t>configuration files for your build </a:t>
+            </a:r>
+            <a:r>
+              <a:rPr lang="en-US" dirty="0" smtClean="0"/>
+              <a:t>process</a:t>
+            </a:r>
+          </a:p>
+          <a:p>
+            <a:r>
+              <a:rPr lang="en-US" dirty="0" smtClean="0"/>
+              <a:t>Automatically</a:t>
+            </a:r>
+            <a:r>
+              <a:rPr lang="en-US" dirty="0"/>
+              <a:t> adds </a:t>
+            </a:r>
+            <a:r>
+              <a:rPr lang="en-US" i="1" dirty="0" err="1" smtClean="0"/>
+              <a:t>node_modules</a:t>
+            </a:r>
+            <a:r>
+              <a:rPr lang="en-US" i="1" dirty="0"/>
+              <a:t>/.</a:t>
+            </a:r>
+            <a:r>
+              <a:rPr lang="en-US" i="1" dirty="0" smtClean="0"/>
+              <a:t>bin</a:t>
+            </a:r>
+            <a:r>
+              <a:rPr lang="en-US" dirty="0" smtClean="0"/>
+              <a:t> to </a:t>
+            </a:r>
+            <a:r>
+              <a:rPr lang="en-US" dirty="0"/>
+              <a:t>the </a:t>
+            </a:r>
+            <a:r>
+              <a:rPr lang="en-US" dirty="0"/>
+              <a:t>PATH</a:t>
+            </a:r>
+            <a:r>
+              <a:rPr lang="en-US" dirty="0"/>
+              <a:t> provided to </a:t>
+            </a:r>
+            <a:r>
+              <a:rPr lang="en-US" dirty="0" smtClean="0"/>
+              <a:t>scripts</a:t>
+            </a:r>
+          </a:p>
+          <a:p>
+            <a:pPr lvl="1"/>
+            <a:r>
+              <a:rPr lang="en-US" dirty="0" smtClean="0"/>
+              <a:t>Less global installs! (</a:t>
+            </a:r>
+            <a:r>
+              <a:rPr lang="en-US" i="1" dirty="0" err="1" smtClean="0"/>
+              <a:t>npm</a:t>
+            </a:r>
+            <a:r>
+              <a:rPr lang="en-US" i="1" dirty="0" smtClean="0"/>
+              <a:t> install –g </a:t>
+            </a:r>
+            <a:r>
+              <a:rPr lang="is-IS" i="1" dirty="0" smtClean="0"/>
+              <a:t>…)</a:t>
+            </a:r>
             <a:endParaRPr lang="en-US" dirty="0"/>
           </a:p>
         </p:txBody>
@@ -7644,13 +7720,7 @@
               <a:rPr lang="en-US" dirty="0" smtClean="0">
                 <a:hlinkClick r:id="rId2"/>
               </a:rPr>
-              <a:t>https://</a:t>
-            </a:r>
-            <a:r>
-              <a:rPr lang="en-US" dirty="0" smtClean="0">
-                <a:hlinkClick r:id="rId2"/>
-              </a:rPr>
-              <a:t>github.com/fyockm/</a:t>
+              <a:t>https://github.com/fyockm/</a:t>
             </a:r>
             <a:r>
               <a:rPr lang="en-US" dirty="0" err="1" smtClean="0">

</xml_diff>

<commit_message>
update readme. add honorable mentions
</commit_message>
<xml_diff>
--- a/npm_scripts.pptx
+++ b/npm_scripts.pptx
@@ -7816,10 +7816,22 @@
           <a:lstStyle/>
           <a:p>
             <a:r>
+              <a:rPr lang="en-US" dirty="0"/>
+              <a:t>Because no one should be shell-scripting inside a JSON file.</a:t>
+            </a:r>
+          </a:p>
+          <a:p>
+            <a:r>
+              <a:rPr lang="en-US" dirty="0" smtClean="0">
+                <a:hlinkClick r:id="rId2"/>
+              </a:rPr>
+              <a:t>https</a:t>
+            </a:r>
+            <a:r>
               <a:rPr lang="en-US" dirty="0">
                 <a:hlinkClick r:id="rId2"/>
               </a:rPr>
-              <a:t>https://</a:t>
+              <a:t>://</a:t>
             </a:r>
             <a:r>
               <a:rPr lang="en-US" dirty="0" smtClean="0">

</xml_diff>